<commit_message>
icon placement fix win11
</commit_message>
<xml_diff>
--- a/GlobalAzure2023_GetYourFuncOnWithAzureFunctions.pptx
+++ b/GlobalAzure2023_GetYourFuncOnWithAzureFunctions.pptx
@@ -28,7 +28,7 @@
       <p:regular r:id="rId12"/>
     </p:embeddedFont>
     <p:embeddedFont>
-      <p:font typeface="Aldrich" panose="02000000000000000000" pitchFamily="2" charset="0"/>
+      <p:font typeface="Aldrich" panose="020B0604020202020204" charset="0"/>
       <p:regular r:id="rId13"/>
     </p:embeddedFont>
     <p:embeddedFont>
@@ -405,7 +405,7 @@
           <a:p>
             <a:fld id="{DD9B018F-CE35-4D11-9224-0AB2FB6DB20F}" type="datetimeFigureOut">
               <a:rPr lang="en-SE" smtClean="0"/>
-              <a:t>2023-05-02</a:t>
+              <a:t>2023-05-10</a:t>
             </a:fld>
             <a:endParaRPr lang="en-SE"/>
           </a:p>
@@ -26674,10 +26674,10 @@
         </p:nvGrpSpPr>
         <p:grpSpPr>
           <a:xfrm>
-            <a:off x="1655522" y="3790720"/>
-            <a:ext cx="837659" cy="660940"/>
-            <a:chOff x="5005724" y="3520061"/>
-            <a:chExt cx="837659" cy="660940"/>
+            <a:off x="1655522" y="3752616"/>
+            <a:ext cx="837659" cy="699044"/>
+            <a:chOff x="5005724" y="3481957"/>
+            <a:chExt cx="837659" cy="699044"/>
           </a:xfrm>
         </p:grpSpPr>
         <p:sp>
@@ -26694,7 +26694,7 @@
           </p:nvSpPr>
           <p:spPr>
             <a:xfrm>
-              <a:off x="5005724" y="3520061"/>
+              <a:off x="5005724" y="3481957"/>
               <a:ext cx="837659" cy="584775"/>
             </a:xfrm>
             <a:prstGeom prst="rect">
@@ -27275,10 +27275,10 @@
         </p:nvGrpSpPr>
         <p:grpSpPr>
           <a:xfrm>
-            <a:off x="3900306" y="3796481"/>
-            <a:ext cx="912824" cy="660940"/>
-            <a:chOff x="7250508" y="3525822"/>
-            <a:chExt cx="912824" cy="660940"/>
+            <a:off x="3900306" y="3763140"/>
+            <a:ext cx="912824" cy="694281"/>
+            <a:chOff x="7250508" y="3492481"/>
+            <a:chExt cx="912824" cy="694281"/>
           </a:xfrm>
         </p:grpSpPr>
         <p:sp>
@@ -27295,7 +27295,7 @@
           </p:nvSpPr>
           <p:spPr>
             <a:xfrm>
-              <a:off x="7261441" y="3525822"/>
+              <a:off x="7261441" y="3492481"/>
               <a:ext cx="837659" cy="584775"/>
             </a:xfrm>
             <a:prstGeom prst="rect">
@@ -32768,8 +32768,8 @@
             <a:chExt cx="137160" cy="237325"/>
           </a:xfrm>
         </p:grpSpPr>
-        <mc:AlternateContent xmlns:mc="http://schemas.openxmlformats.org/markup-compatibility/2006">
-          <mc:Choice xmlns:p14="http://schemas.microsoft.com/office/powerpoint/2010/main" Requires="p14">
+        <mc:AlternateContent xmlns:mc="http://schemas.openxmlformats.org/markup-compatibility/2006" xmlns:p14="http://schemas.microsoft.com/office/powerpoint/2010/main">
+          <mc:Choice Requires="p14">
             <p:contentPart p14:bwMode="auto" r:id="rId4">
               <p14:nvContentPartPr>
                 <p14:cNvPr id="35" name="Ink 34">
@@ -32788,7 +32788,7 @@
               </p14:xfrm>
             </p:contentPart>
           </mc:Choice>
-          <mc:Fallback>
+          <mc:Fallback xmlns="">
             <p:pic>
               <p:nvPicPr>
                 <p:cNvPr id="35" name="Ink 34">
@@ -32819,8 +32819,8 @@
             </p:pic>
           </mc:Fallback>
         </mc:AlternateContent>
-        <mc:AlternateContent xmlns:mc="http://schemas.openxmlformats.org/markup-compatibility/2006">
-          <mc:Choice xmlns:p14="http://schemas.microsoft.com/office/powerpoint/2010/main" Requires="p14">
+        <mc:AlternateContent xmlns:mc="http://schemas.openxmlformats.org/markup-compatibility/2006" xmlns:p14="http://schemas.microsoft.com/office/powerpoint/2010/main">
+          <mc:Choice Requires="p14">
             <p:contentPart p14:bwMode="auto" r:id="rId6">
               <p14:nvContentPartPr>
                 <p14:cNvPr id="390" name="Ink 389">
@@ -32839,7 +32839,7 @@
               </p14:xfrm>
             </p:contentPart>
           </mc:Choice>
-          <mc:Fallback>
+          <mc:Fallback xmlns="">
             <p:pic>
               <p:nvPicPr>
                 <p:cNvPr id="390" name="Ink 389">
@@ -32891,8 +32891,8 @@
             <a:chExt cx="257400" cy="126720"/>
           </a:xfrm>
         </p:grpSpPr>
-        <mc:AlternateContent xmlns:mc="http://schemas.openxmlformats.org/markup-compatibility/2006">
-          <mc:Choice xmlns:p14="http://schemas.microsoft.com/office/powerpoint/2010/main" Requires="p14">
+        <mc:AlternateContent xmlns:mc="http://schemas.openxmlformats.org/markup-compatibility/2006" xmlns:p14="http://schemas.microsoft.com/office/powerpoint/2010/main">
+          <mc:Choice Requires="p14">
             <p:contentPart p14:bwMode="auto" r:id="rId8">
               <p14:nvContentPartPr>
                 <p14:cNvPr id="558" name="Ink 557">
@@ -32911,7 +32911,7 @@
               </p14:xfrm>
             </p:contentPart>
           </mc:Choice>
-          <mc:Fallback>
+          <mc:Fallback xmlns="">
             <p:pic>
               <p:nvPicPr>
                 <p:cNvPr id="558" name="Ink 557">
@@ -32942,8 +32942,8 @@
             </p:pic>
           </mc:Fallback>
         </mc:AlternateContent>
-        <mc:AlternateContent xmlns:mc="http://schemas.openxmlformats.org/markup-compatibility/2006">
-          <mc:Choice xmlns:p14="http://schemas.microsoft.com/office/powerpoint/2010/main" Requires="p14">
+        <mc:AlternateContent xmlns:mc="http://schemas.openxmlformats.org/markup-compatibility/2006" xmlns:p14="http://schemas.microsoft.com/office/powerpoint/2010/main">
+          <mc:Choice Requires="p14">
             <p:contentPart p14:bwMode="auto" r:id="rId10">
               <p14:nvContentPartPr>
                 <p14:cNvPr id="564" name="Ink 563">
@@ -32962,7 +32962,7 @@
               </p14:xfrm>
             </p:contentPart>
           </mc:Choice>
-          <mc:Fallback>
+          <mc:Fallback xmlns="">
             <p:pic>
               <p:nvPicPr>
                 <p:cNvPr id="564" name="Ink 563">
@@ -33014,8 +33014,8 @@
             <a:chExt cx="276480" cy="141120"/>
           </a:xfrm>
         </p:grpSpPr>
-        <mc:AlternateContent xmlns:mc="http://schemas.openxmlformats.org/markup-compatibility/2006">
-          <mc:Choice xmlns:p14="http://schemas.microsoft.com/office/powerpoint/2010/main" Requires="p14">
+        <mc:AlternateContent xmlns:mc="http://schemas.openxmlformats.org/markup-compatibility/2006" xmlns:p14="http://schemas.microsoft.com/office/powerpoint/2010/main">
+          <mc:Choice Requires="p14">
             <p:contentPart p14:bwMode="auto" r:id="rId12">
               <p14:nvContentPartPr>
                 <p14:cNvPr id="567" name="Ink 566">
@@ -33034,7 +33034,7 @@
               </p14:xfrm>
             </p:contentPart>
           </mc:Choice>
-          <mc:Fallback>
+          <mc:Fallback xmlns="">
             <p:pic>
               <p:nvPicPr>
                 <p:cNvPr id="567" name="Ink 566">
@@ -33065,8 +33065,8 @@
             </p:pic>
           </mc:Fallback>
         </mc:AlternateContent>
-        <mc:AlternateContent xmlns:mc="http://schemas.openxmlformats.org/markup-compatibility/2006">
-          <mc:Choice xmlns:p14="http://schemas.microsoft.com/office/powerpoint/2010/main" Requires="p14">
+        <mc:AlternateContent xmlns:mc="http://schemas.openxmlformats.org/markup-compatibility/2006" xmlns:p14="http://schemas.microsoft.com/office/powerpoint/2010/main">
+          <mc:Choice Requires="p14">
             <p:contentPart p14:bwMode="auto" r:id="rId14">
               <p14:nvContentPartPr>
                 <p14:cNvPr id="573" name="Ink 572">
@@ -33085,7 +33085,7 @@
               </p14:xfrm>
             </p:contentPart>
           </mc:Choice>
-          <mc:Fallback>
+          <mc:Fallback xmlns="">
             <p:pic>
               <p:nvPicPr>
                 <p:cNvPr id="573" name="Ink 572">
@@ -33584,8 +33584,8 @@
             <a:chExt cx="364680" cy="316080"/>
           </a:xfrm>
         </p:grpSpPr>
-        <mc:AlternateContent xmlns:mc="http://schemas.openxmlformats.org/markup-compatibility/2006">
-          <mc:Choice xmlns:p14="http://schemas.microsoft.com/office/powerpoint/2010/main" Requires="p14">
+        <mc:AlternateContent xmlns:mc="http://schemas.openxmlformats.org/markup-compatibility/2006" xmlns:p14="http://schemas.microsoft.com/office/powerpoint/2010/main">
+          <mc:Choice Requires="p14">
             <p:contentPart p14:bwMode="auto" r:id="rId20">
               <p14:nvContentPartPr>
                 <p14:cNvPr id="659" name="Ink 658">
@@ -33604,7 +33604,7 @@
               </p14:xfrm>
             </p:contentPart>
           </mc:Choice>
-          <mc:Fallback>
+          <mc:Fallback xmlns="">
             <p:pic>
               <p:nvPicPr>
                 <p:cNvPr id="659" name="Ink 658">
@@ -33635,8 +33635,8 @@
             </p:pic>
           </mc:Fallback>
         </mc:AlternateContent>
-        <mc:AlternateContent xmlns:mc="http://schemas.openxmlformats.org/markup-compatibility/2006">
-          <mc:Choice xmlns:p14="http://schemas.microsoft.com/office/powerpoint/2010/main" Requires="p14">
+        <mc:AlternateContent xmlns:mc="http://schemas.openxmlformats.org/markup-compatibility/2006" xmlns:p14="http://schemas.microsoft.com/office/powerpoint/2010/main">
+          <mc:Choice Requires="p14">
             <p:contentPart p14:bwMode="auto" r:id="rId22">
               <p14:nvContentPartPr>
                 <p14:cNvPr id="663" name="Ink 662">
@@ -33655,7 +33655,7 @@
               </p14:xfrm>
             </p:contentPart>
           </mc:Choice>
-          <mc:Fallback>
+          <mc:Fallback xmlns="">
             <p:pic>
               <p:nvPicPr>
                 <p:cNvPr id="663" name="Ink 662">
@@ -33686,8 +33686,8 @@
             </p:pic>
           </mc:Fallback>
         </mc:AlternateContent>
-        <mc:AlternateContent xmlns:mc="http://schemas.openxmlformats.org/markup-compatibility/2006">
-          <mc:Choice xmlns:p14="http://schemas.microsoft.com/office/powerpoint/2010/main" Requires="p14">
+        <mc:AlternateContent xmlns:mc="http://schemas.openxmlformats.org/markup-compatibility/2006" xmlns:p14="http://schemas.microsoft.com/office/powerpoint/2010/main">
+          <mc:Choice Requires="p14">
             <p:contentPart p14:bwMode="auto" r:id="rId24">
               <p14:nvContentPartPr>
                 <p14:cNvPr id="665" name="Ink 664">
@@ -33706,7 +33706,7 @@
               </p14:xfrm>
             </p:contentPart>
           </mc:Choice>
-          <mc:Fallback>
+          <mc:Fallback xmlns="">
             <p:pic>
               <p:nvPicPr>
                 <p:cNvPr id="665" name="Ink 664">
@@ -33737,8 +33737,8 @@
             </p:pic>
           </mc:Fallback>
         </mc:AlternateContent>
-        <mc:AlternateContent xmlns:mc="http://schemas.openxmlformats.org/markup-compatibility/2006">
-          <mc:Choice xmlns:p14="http://schemas.microsoft.com/office/powerpoint/2010/main" Requires="p14">
+        <mc:AlternateContent xmlns:mc="http://schemas.openxmlformats.org/markup-compatibility/2006" xmlns:p14="http://schemas.microsoft.com/office/powerpoint/2010/main">
+          <mc:Choice Requires="p14">
             <p:contentPart p14:bwMode="auto" r:id="rId26">
               <p14:nvContentPartPr>
                 <p14:cNvPr id="668" name="Ink 667">
@@ -33757,7 +33757,7 @@
               </p14:xfrm>
             </p:contentPart>
           </mc:Choice>
-          <mc:Fallback>
+          <mc:Fallback xmlns="">
             <p:pic>
               <p:nvPicPr>
                 <p:cNvPr id="668" name="Ink 667">
@@ -33915,8 +33915,8 @@
             <a:chExt cx="697975" cy="155880"/>
           </a:xfrm>
         </p:grpSpPr>
-        <mc:AlternateContent xmlns:mc="http://schemas.openxmlformats.org/markup-compatibility/2006">
-          <mc:Choice xmlns:p14="http://schemas.microsoft.com/office/powerpoint/2010/main" Requires="p14">
+        <mc:AlternateContent xmlns:mc="http://schemas.openxmlformats.org/markup-compatibility/2006" xmlns:p14="http://schemas.microsoft.com/office/powerpoint/2010/main">
+          <mc:Choice Requires="p14">
             <p:contentPart p14:bwMode="auto" r:id="rId30">
               <p14:nvContentPartPr>
                 <p14:cNvPr id="48" name="Ink 47">
@@ -33935,7 +33935,7 @@
               </p14:xfrm>
             </p:contentPart>
           </mc:Choice>
-          <mc:Fallback>
+          <mc:Fallback xmlns="">
             <p:pic>
               <p:nvPicPr>
                 <p:cNvPr id="48" name="Ink 47">
@@ -33966,8 +33966,8 @@
             </p:pic>
           </mc:Fallback>
         </mc:AlternateContent>
-        <mc:AlternateContent xmlns:mc="http://schemas.openxmlformats.org/markup-compatibility/2006">
-          <mc:Choice xmlns:p14="http://schemas.microsoft.com/office/powerpoint/2010/main" Requires="p14">
+        <mc:AlternateContent xmlns:mc="http://schemas.openxmlformats.org/markup-compatibility/2006" xmlns:p14="http://schemas.microsoft.com/office/powerpoint/2010/main">
+          <mc:Choice Requires="p14">
             <p:contentPart p14:bwMode="auto" r:id="rId32">
               <p14:nvContentPartPr>
                 <p14:cNvPr id="50" name="Ink 49">
@@ -33986,7 +33986,7 @@
               </p14:xfrm>
             </p:contentPart>
           </mc:Choice>
-          <mc:Fallback>
+          <mc:Fallback xmlns="">
             <p:pic>
               <p:nvPicPr>
                 <p:cNvPr id="50" name="Ink 49">
@@ -34378,8 +34378,8 @@
             <a:chExt cx="135360" cy="253025"/>
           </a:xfrm>
         </p:grpSpPr>
-        <mc:AlternateContent xmlns:mc="http://schemas.openxmlformats.org/markup-compatibility/2006">
-          <mc:Choice xmlns:p14="http://schemas.microsoft.com/office/powerpoint/2010/main" Requires="p14">
+        <mc:AlternateContent xmlns:mc="http://schemas.openxmlformats.org/markup-compatibility/2006" xmlns:p14="http://schemas.microsoft.com/office/powerpoint/2010/main">
+          <mc:Choice Requires="p14">
             <p:contentPart p14:bwMode="auto" r:id="rId34">
               <p14:nvContentPartPr>
                 <p14:cNvPr id="448" name="Ink 447">
@@ -34398,7 +34398,7 @@
               </p14:xfrm>
             </p:contentPart>
           </mc:Choice>
-          <mc:Fallback>
+          <mc:Fallback xmlns="">
             <p:pic>
               <p:nvPicPr>
                 <p:cNvPr id="448" name="Ink 447">
@@ -34429,8 +34429,8 @@
             </p:pic>
           </mc:Fallback>
         </mc:AlternateContent>
-        <mc:AlternateContent xmlns:mc="http://schemas.openxmlformats.org/markup-compatibility/2006">
-          <mc:Choice xmlns:p14="http://schemas.microsoft.com/office/powerpoint/2010/main" Requires="p14">
+        <mc:AlternateContent xmlns:mc="http://schemas.openxmlformats.org/markup-compatibility/2006" xmlns:p14="http://schemas.microsoft.com/office/powerpoint/2010/main">
+          <mc:Choice Requires="p14">
             <p:contentPart p14:bwMode="auto" r:id="rId36">
               <p14:nvContentPartPr>
                 <p14:cNvPr id="466" name="Ink 465">
@@ -34449,7 +34449,7 @@
               </p14:xfrm>
             </p:contentPart>
           </mc:Choice>
-          <mc:Fallback>
+          <mc:Fallback xmlns="">
             <p:pic>
               <p:nvPicPr>
                 <p:cNvPr id="466" name="Ink 465">
@@ -34501,8 +34501,8 @@
             <a:chExt cx="953400" cy="174240"/>
           </a:xfrm>
         </p:grpSpPr>
-        <mc:AlternateContent xmlns:mc="http://schemas.openxmlformats.org/markup-compatibility/2006">
-          <mc:Choice xmlns:p14="http://schemas.microsoft.com/office/powerpoint/2010/main" Requires="p14">
+        <mc:AlternateContent xmlns:mc="http://schemas.openxmlformats.org/markup-compatibility/2006" xmlns:p14="http://schemas.microsoft.com/office/powerpoint/2010/main">
+          <mc:Choice Requires="p14">
             <p:contentPart p14:bwMode="auto" r:id="rId38">
               <p14:nvContentPartPr>
                 <p14:cNvPr id="470" name="Ink 469">
@@ -34521,7 +34521,7 @@
               </p14:xfrm>
             </p:contentPart>
           </mc:Choice>
-          <mc:Fallback>
+          <mc:Fallback xmlns="">
             <p:pic>
               <p:nvPicPr>
                 <p:cNvPr id="470" name="Ink 469">
@@ -34552,8 +34552,8 @@
             </p:pic>
           </mc:Fallback>
         </mc:AlternateContent>
-        <mc:AlternateContent xmlns:mc="http://schemas.openxmlformats.org/markup-compatibility/2006">
-          <mc:Choice xmlns:p14="http://schemas.microsoft.com/office/powerpoint/2010/main" Requires="p14">
+        <mc:AlternateContent xmlns:mc="http://schemas.openxmlformats.org/markup-compatibility/2006" xmlns:p14="http://schemas.microsoft.com/office/powerpoint/2010/main">
+          <mc:Choice Requires="p14">
             <p:contentPart p14:bwMode="auto" r:id="rId40">
               <p14:nvContentPartPr>
                 <p14:cNvPr id="487" name="Ink 486">
@@ -34572,7 +34572,7 @@
               </p14:xfrm>
             </p:contentPart>
           </mc:Choice>
-          <mc:Fallback>
+          <mc:Fallback xmlns="">
             <p:pic>
               <p:nvPicPr>
                 <p:cNvPr id="487" name="Ink 486">
@@ -34624,8 +34624,8 @@
             <a:chExt cx="106920" cy="252439"/>
           </a:xfrm>
         </p:grpSpPr>
-        <mc:AlternateContent xmlns:mc="http://schemas.openxmlformats.org/markup-compatibility/2006">
-          <mc:Choice xmlns:p14="http://schemas.microsoft.com/office/powerpoint/2010/main" Requires="p14">
+        <mc:AlternateContent xmlns:mc="http://schemas.openxmlformats.org/markup-compatibility/2006" xmlns:p14="http://schemas.microsoft.com/office/powerpoint/2010/main">
+          <mc:Choice Requires="p14">
             <p:contentPart p14:bwMode="auto" r:id="rId42">
               <p14:nvContentPartPr>
                 <p14:cNvPr id="513" name="Ink 512">
@@ -34644,7 +34644,7 @@
               </p14:xfrm>
             </p:contentPart>
           </mc:Choice>
-          <mc:Fallback>
+          <mc:Fallback xmlns="">
             <p:pic>
               <p:nvPicPr>
                 <p:cNvPr id="513" name="Ink 512">
@@ -34675,8 +34675,8 @@
             </p:pic>
           </mc:Fallback>
         </mc:AlternateContent>
-        <mc:AlternateContent xmlns:mc="http://schemas.openxmlformats.org/markup-compatibility/2006">
-          <mc:Choice xmlns:p14="http://schemas.microsoft.com/office/powerpoint/2010/main" Requires="p14">
+        <mc:AlternateContent xmlns:mc="http://schemas.openxmlformats.org/markup-compatibility/2006" xmlns:p14="http://schemas.microsoft.com/office/powerpoint/2010/main">
+          <mc:Choice Requires="p14">
             <p:contentPart p14:bwMode="auto" r:id="rId44">
               <p14:nvContentPartPr>
                 <p14:cNvPr id="518" name="Ink 517">
@@ -34695,7 +34695,7 @@
               </p14:xfrm>
             </p:contentPart>
           </mc:Choice>
-          <mc:Fallback>
+          <mc:Fallback xmlns="">
             <p:pic>
               <p:nvPicPr>
                 <p:cNvPr id="518" name="Ink 517">
@@ -35095,13 +35095,13 @@
   <p:clrMapOvr>
     <a:masterClrMapping/>
   </p:clrMapOvr>
-  <mc:AlternateContent xmlns:mc="http://schemas.openxmlformats.org/markup-compatibility/2006">
-    <mc:Choice xmlns:p14="http://schemas.microsoft.com/office/powerpoint/2010/main" Requires="p14">
+  <mc:AlternateContent xmlns:mc="http://schemas.openxmlformats.org/markup-compatibility/2006" xmlns:p14="http://schemas.microsoft.com/office/powerpoint/2010/main">
+    <mc:Choice Requires="p14">
       <p:transition spd="med" p14:dur="700">
         <p:fade/>
       </p:transition>
     </mc:Choice>
-    <mc:Fallback>
+    <mc:Fallback xmlns="">
       <p:transition spd="med">
         <p:fade/>
       </p:transition>
@@ -37056,8 +37056,8 @@
             <a:chExt cx="3907080" cy="1721160"/>
           </a:xfrm>
         </p:grpSpPr>
-        <mc:AlternateContent xmlns:mc="http://schemas.openxmlformats.org/markup-compatibility/2006">
-          <mc:Choice xmlns:p14="http://schemas.microsoft.com/office/powerpoint/2010/main" Requires="p14">
+        <mc:AlternateContent xmlns:mc="http://schemas.openxmlformats.org/markup-compatibility/2006" xmlns:p14="http://schemas.microsoft.com/office/powerpoint/2010/main">
+          <mc:Choice Requires="p14">
             <p:contentPart p14:bwMode="auto" r:id="rId3">
               <p14:nvContentPartPr>
                 <p14:cNvPr id="27" name="Ink 26">
@@ -37076,7 +37076,7 @@
               </p14:xfrm>
             </p:contentPart>
           </mc:Choice>
-          <mc:Fallback>
+          <mc:Fallback xmlns="">
             <p:pic>
               <p:nvPicPr>
                 <p:cNvPr id="27" name="Ink 26">
@@ -37107,8 +37107,8 @@
             </p:pic>
           </mc:Fallback>
         </mc:AlternateContent>
-        <mc:AlternateContent xmlns:mc="http://schemas.openxmlformats.org/markup-compatibility/2006">
-          <mc:Choice xmlns:p14="http://schemas.microsoft.com/office/powerpoint/2010/main" Requires="p14">
+        <mc:AlternateContent xmlns:mc="http://schemas.openxmlformats.org/markup-compatibility/2006" xmlns:p14="http://schemas.microsoft.com/office/powerpoint/2010/main">
+          <mc:Choice Requires="p14">
             <p:contentPart p14:bwMode="auto" r:id="rId5">
               <p14:nvContentPartPr>
                 <p14:cNvPr id="31" name="Ink 30">
@@ -37127,7 +37127,7 @@
               </p14:xfrm>
             </p:contentPart>
           </mc:Choice>
-          <mc:Fallback>
+          <mc:Fallback xmlns="">
             <p:pic>
               <p:nvPicPr>
                 <p:cNvPr id="31" name="Ink 30">
@@ -37158,8 +37158,8 @@
             </p:pic>
           </mc:Fallback>
         </mc:AlternateContent>
-        <mc:AlternateContent xmlns:mc="http://schemas.openxmlformats.org/markup-compatibility/2006">
-          <mc:Choice xmlns:p14="http://schemas.microsoft.com/office/powerpoint/2010/main" Requires="p14">
+        <mc:AlternateContent xmlns:mc="http://schemas.openxmlformats.org/markup-compatibility/2006" xmlns:p14="http://schemas.microsoft.com/office/powerpoint/2010/main">
+          <mc:Choice Requires="p14">
             <p:contentPart p14:bwMode="auto" r:id="rId7">
               <p14:nvContentPartPr>
                 <p14:cNvPr id="881" name="Ink 880">
@@ -37178,7 +37178,7 @@
               </p14:xfrm>
             </p:contentPart>
           </mc:Choice>
-          <mc:Fallback>
+          <mc:Fallback xmlns="">
             <p:pic>
               <p:nvPicPr>
                 <p:cNvPr id="881" name="Ink 880">
@@ -37209,8 +37209,8 @@
             </p:pic>
           </mc:Fallback>
         </mc:AlternateContent>
-        <mc:AlternateContent xmlns:mc="http://schemas.openxmlformats.org/markup-compatibility/2006">
-          <mc:Choice xmlns:p14="http://schemas.microsoft.com/office/powerpoint/2010/main" Requires="p14">
+        <mc:AlternateContent xmlns:mc="http://schemas.openxmlformats.org/markup-compatibility/2006" xmlns:p14="http://schemas.microsoft.com/office/powerpoint/2010/main">
+          <mc:Choice Requires="p14">
             <p:contentPart p14:bwMode="auto" r:id="rId9">
               <p14:nvContentPartPr>
                 <p14:cNvPr id="904" name="Ink 903">
@@ -37229,7 +37229,7 @@
               </p14:xfrm>
             </p:contentPart>
           </mc:Choice>
-          <mc:Fallback>
+          <mc:Fallback xmlns="">
             <p:pic>
               <p:nvPicPr>
                 <p:cNvPr id="904" name="Ink 903">
@@ -37260,8 +37260,8 @@
             </p:pic>
           </mc:Fallback>
         </mc:AlternateContent>
-        <mc:AlternateContent xmlns:mc="http://schemas.openxmlformats.org/markup-compatibility/2006">
-          <mc:Choice xmlns:p14="http://schemas.microsoft.com/office/powerpoint/2010/main" Requires="p14">
+        <mc:AlternateContent xmlns:mc="http://schemas.openxmlformats.org/markup-compatibility/2006" xmlns:p14="http://schemas.microsoft.com/office/powerpoint/2010/main">
+          <mc:Choice Requires="p14">
             <p:contentPart p14:bwMode="auto" r:id="rId11">
               <p14:nvContentPartPr>
                 <p14:cNvPr id="988" name="Ink 987">
@@ -37280,7 +37280,7 @@
               </p14:xfrm>
             </p:contentPart>
           </mc:Choice>
-          <mc:Fallback>
+          <mc:Fallback xmlns="">
             <p:pic>
               <p:nvPicPr>
                 <p:cNvPr id="988" name="Ink 987">
@@ -37311,8 +37311,8 @@
             </p:pic>
           </mc:Fallback>
         </mc:AlternateContent>
-        <mc:AlternateContent xmlns:mc="http://schemas.openxmlformats.org/markup-compatibility/2006">
-          <mc:Choice xmlns:p14="http://schemas.microsoft.com/office/powerpoint/2010/main" Requires="p14">
+        <mc:AlternateContent xmlns:mc="http://schemas.openxmlformats.org/markup-compatibility/2006" xmlns:p14="http://schemas.microsoft.com/office/powerpoint/2010/main">
+          <mc:Choice Requires="p14">
             <p:contentPart p14:bwMode="auto" r:id="rId13">
               <p14:nvContentPartPr>
                 <p14:cNvPr id="1003" name="Ink 1002">
@@ -37331,7 +37331,7 @@
               </p14:xfrm>
             </p:contentPart>
           </mc:Choice>
-          <mc:Fallback>
+          <mc:Fallback xmlns="">
             <p:pic>
               <p:nvPicPr>
                 <p:cNvPr id="1003" name="Ink 1002">
@@ -37362,8 +37362,8 @@
             </p:pic>
           </mc:Fallback>
         </mc:AlternateContent>
-        <mc:AlternateContent xmlns:mc="http://schemas.openxmlformats.org/markup-compatibility/2006">
-          <mc:Choice xmlns:p14="http://schemas.microsoft.com/office/powerpoint/2010/main" Requires="p14">
+        <mc:AlternateContent xmlns:mc="http://schemas.openxmlformats.org/markup-compatibility/2006" xmlns:p14="http://schemas.microsoft.com/office/powerpoint/2010/main">
+          <mc:Choice Requires="p14">
             <p:contentPart p14:bwMode="auto" r:id="rId15">
               <p14:nvContentPartPr>
                 <p14:cNvPr id="32" name="Ink 31">
@@ -37382,7 +37382,7 @@
               </p14:xfrm>
             </p:contentPart>
           </mc:Choice>
-          <mc:Fallback>
+          <mc:Fallback xmlns="">
             <p:pic>
               <p:nvPicPr>
                 <p:cNvPr id="32" name="Ink 31">
@@ -37413,8 +37413,8 @@
             </p:pic>
           </mc:Fallback>
         </mc:AlternateContent>
-        <mc:AlternateContent xmlns:mc="http://schemas.openxmlformats.org/markup-compatibility/2006">
-          <mc:Choice xmlns:p14="http://schemas.microsoft.com/office/powerpoint/2010/main" Requires="p14">
+        <mc:AlternateContent xmlns:mc="http://schemas.openxmlformats.org/markup-compatibility/2006" xmlns:p14="http://schemas.microsoft.com/office/powerpoint/2010/main">
+          <mc:Choice Requires="p14">
             <p:contentPart p14:bwMode="auto" r:id="rId17">
               <p14:nvContentPartPr>
                 <p14:cNvPr id="1010" name="Ink 1009">
@@ -37433,7 +37433,7 @@
               </p14:xfrm>
             </p:contentPart>
           </mc:Choice>
-          <mc:Fallback>
+          <mc:Fallback xmlns="">
             <p:pic>
               <p:nvPicPr>
                 <p:cNvPr id="1010" name="Ink 1009">
@@ -37464,8 +37464,8 @@
             </p:pic>
           </mc:Fallback>
         </mc:AlternateContent>
-        <mc:AlternateContent xmlns:mc="http://schemas.openxmlformats.org/markup-compatibility/2006">
-          <mc:Choice xmlns:p14="http://schemas.microsoft.com/office/powerpoint/2010/main" Requires="p14">
+        <mc:AlternateContent xmlns:mc="http://schemas.openxmlformats.org/markup-compatibility/2006" xmlns:p14="http://schemas.microsoft.com/office/powerpoint/2010/main">
+          <mc:Choice Requires="p14">
             <p:contentPart p14:bwMode="auto" r:id="rId19">
               <p14:nvContentPartPr>
                 <p14:cNvPr id="963" name="Ink 962">
@@ -37484,7 +37484,7 @@
               </p14:xfrm>
             </p:contentPart>
           </mc:Choice>
-          <mc:Fallback>
+          <mc:Fallback xmlns="">
             <p:pic>
               <p:nvPicPr>
                 <p:cNvPr id="963" name="Ink 962">
@@ -37515,8 +37515,8 @@
             </p:pic>
           </mc:Fallback>
         </mc:AlternateContent>
-        <mc:AlternateContent xmlns:mc="http://schemas.openxmlformats.org/markup-compatibility/2006">
-          <mc:Choice xmlns:p14="http://schemas.microsoft.com/office/powerpoint/2010/main" Requires="p14">
+        <mc:AlternateContent xmlns:mc="http://schemas.openxmlformats.org/markup-compatibility/2006" xmlns:p14="http://schemas.microsoft.com/office/powerpoint/2010/main">
+          <mc:Choice Requires="p14">
             <p:contentPart p14:bwMode="auto" r:id="rId21">
               <p14:nvContentPartPr>
                 <p14:cNvPr id="979" name="Ink 978">
@@ -37535,7 +37535,7 @@
               </p14:xfrm>
             </p:contentPart>
           </mc:Choice>
-          <mc:Fallback>
+          <mc:Fallback xmlns="">
             <p:pic>
               <p:nvPicPr>
                 <p:cNvPr id="979" name="Ink 978">

</xml_diff>